<commit_message>
corrected graphs, new doc v3
</commit_message>
<xml_diff>
--- a/misc_proxeiro/arch_graphs.pptx
+++ b/misc_proxeiro/arch_graphs.pptx
@@ -6,7 +6,7 @@
   </p:sldMasterIdLst>
   <p:sldIdLst>
     <p:sldId id="256" r:id="rId2"/>
-    <p:sldId id="257" r:id="rId3"/>
+    <p:sldId id="259" r:id="rId3"/>
   </p:sldIdLst>
   <p:sldSz cx="12192000" cy="6858000"/>
   <p:notesSz cx="6858000" cy="9144000"/>
@@ -105,6 +105,11 @@
       </a:defRPr>
     </a:lvl9pPr>
   </p:defaultTextStyle>
+  <p:extLst>
+    <p:ext uri="{EFAFB233-063F-42B5-8137-9DF3F51BA10A}">
+      <p15:sldGuideLst xmlns:p15="http://schemas.microsoft.com/office/powerpoint/2012/main"/>
+    </p:ext>
+  </p:extLst>
 </p:presentation>
 </file>
 
@@ -255,7 +260,7 @@
           <a:p>
             <a:fld id="{A0CC2D50-4BB6-4CFC-9964-271403DBA71F}" type="datetimeFigureOut">
               <a:rPr lang="en-US" smtClean="0"/>
-              <a:t>20-Dec-25</a:t>
+              <a:t>24-Dec-25</a:t>
             </a:fld>
             <a:endParaRPr lang="en-US"/>
           </a:p>
@@ -453,7 +458,7 @@
           <a:p>
             <a:fld id="{A0CC2D50-4BB6-4CFC-9964-271403DBA71F}" type="datetimeFigureOut">
               <a:rPr lang="en-US" smtClean="0"/>
-              <a:t>20-Dec-25</a:t>
+              <a:t>24-Dec-25</a:t>
             </a:fld>
             <a:endParaRPr lang="en-US"/>
           </a:p>
@@ -661,7 +666,7 @@
           <a:p>
             <a:fld id="{A0CC2D50-4BB6-4CFC-9964-271403DBA71F}" type="datetimeFigureOut">
               <a:rPr lang="en-US" smtClean="0"/>
-              <a:t>20-Dec-25</a:t>
+              <a:t>24-Dec-25</a:t>
             </a:fld>
             <a:endParaRPr lang="en-US"/>
           </a:p>
@@ -859,7 +864,7 @@
           <a:p>
             <a:fld id="{A0CC2D50-4BB6-4CFC-9964-271403DBA71F}" type="datetimeFigureOut">
               <a:rPr lang="en-US" smtClean="0"/>
-              <a:t>20-Dec-25</a:t>
+              <a:t>24-Dec-25</a:t>
             </a:fld>
             <a:endParaRPr lang="en-US"/>
           </a:p>
@@ -1134,7 +1139,7 @@
           <a:p>
             <a:fld id="{A0CC2D50-4BB6-4CFC-9964-271403DBA71F}" type="datetimeFigureOut">
               <a:rPr lang="en-US" smtClean="0"/>
-              <a:t>20-Dec-25</a:t>
+              <a:t>24-Dec-25</a:t>
             </a:fld>
             <a:endParaRPr lang="en-US"/>
           </a:p>
@@ -1399,7 +1404,7 @@
           <a:p>
             <a:fld id="{A0CC2D50-4BB6-4CFC-9964-271403DBA71F}" type="datetimeFigureOut">
               <a:rPr lang="en-US" smtClean="0"/>
-              <a:t>20-Dec-25</a:t>
+              <a:t>24-Dec-25</a:t>
             </a:fld>
             <a:endParaRPr lang="en-US"/>
           </a:p>
@@ -1811,7 +1816,7 @@
           <a:p>
             <a:fld id="{A0CC2D50-4BB6-4CFC-9964-271403DBA71F}" type="datetimeFigureOut">
               <a:rPr lang="en-US" smtClean="0"/>
-              <a:t>20-Dec-25</a:t>
+              <a:t>24-Dec-25</a:t>
             </a:fld>
             <a:endParaRPr lang="en-US"/>
           </a:p>
@@ -1952,7 +1957,7 @@
           <a:p>
             <a:fld id="{A0CC2D50-4BB6-4CFC-9964-271403DBA71F}" type="datetimeFigureOut">
               <a:rPr lang="en-US" smtClean="0"/>
-              <a:t>20-Dec-25</a:t>
+              <a:t>24-Dec-25</a:t>
             </a:fld>
             <a:endParaRPr lang="en-US"/>
           </a:p>
@@ -2065,7 +2070,7 @@
           <a:p>
             <a:fld id="{A0CC2D50-4BB6-4CFC-9964-271403DBA71F}" type="datetimeFigureOut">
               <a:rPr lang="en-US" smtClean="0"/>
-              <a:t>20-Dec-25</a:t>
+              <a:t>24-Dec-25</a:t>
             </a:fld>
             <a:endParaRPr lang="en-US"/>
           </a:p>
@@ -2376,7 +2381,7 @@
           <a:p>
             <a:fld id="{A0CC2D50-4BB6-4CFC-9964-271403DBA71F}" type="datetimeFigureOut">
               <a:rPr lang="en-US" smtClean="0"/>
-              <a:t>20-Dec-25</a:t>
+              <a:t>24-Dec-25</a:t>
             </a:fld>
             <a:endParaRPr lang="en-US"/>
           </a:p>
@@ -2664,7 +2669,7 @@
           <a:p>
             <a:fld id="{A0CC2D50-4BB6-4CFC-9964-271403DBA71F}" type="datetimeFigureOut">
               <a:rPr lang="en-US" smtClean="0"/>
-              <a:t>20-Dec-25</a:t>
+              <a:t>24-Dec-25</a:t>
             </a:fld>
             <a:endParaRPr lang="en-US"/>
           </a:p>
@@ -2905,7 +2910,7 @@
           <a:p>
             <a:fld id="{A0CC2D50-4BB6-4CFC-9964-271403DBA71F}" type="datetimeFigureOut">
               <a:rPr lang="en-US" smtClean="0"/>
-              <a:t>20-Dec-25</a:t>
+              <a:t>24-Dec-25</a:t>
             </a:fld>
             <a:endParaRPr lang="en-US"/>
           </a:p>
@@ -3781,16 +3786,12 @@
           <a:p>
             <a:pPr algn="ctr"/>
             <a:r>
-              <a:rPr lang="en-US" sz="1100" dirty="0" err="1">
+              <a:rPr lang="en-US" sz="1100" dirty="0">
                 <a:latin typeface="Helvetica" panose="020B0604020202020204" pitchFamily="34" charset="0"/>
                 <a:cs typeface="Helvetica" panose="020B0604020202020204" pitchFamily="34" charset="0"/>
               </a:rPr>
               <a:t>Fuzzify</a:t>
             </a:r>
-            <a:endParaRPr lang="en-US" sz="1100" dirty="0">
-              <a:latin typeface="Helvetica" panose="020B0604020202020204" pitchFamily="34" charset="0"/>
-              <a:cs typeface="Helvetica" panose="020B0604020202020204" pitchFamily="34" charset="0"/>
-            </a:endParaRPr>
           </a:p>
           <a:p>
             <a:pPr algn="ctr"/>
@@ -3845,18 +3846,11 @@
           <a:p>
             <a:pPr algn="ctr"/>
             <a:r>
-              <a:rPr lang="en-US" sz="1100" dirty="0" err="1">
-                <a:latin typeface="Helvetica" panose="020B0604020202020204" pitchFamily="34" charset="0"/>
-                <a:cs typeface="Helvetica" panose="020B0604020202020204" pitchFamily="34" charset="0"/>
-              </a:rPr>
-              <a:t>Defyzzification</a:t>
-            </a:r>
-            <a:r>
               <a:rPr lang="en-US" sz="1100" dirty="0">
                 <a:latin typeface="Helvetica" panose="020B0604020202020204" pitchFamily="34" charset="0"/>
                 <a:cs typeface="Helvetica" panose="020B0604020202020204" pitchFamily="34" charset="0"/>
               </a:rPr>
-              <a:t> layer</a:t>
+              <a:t>Defuzzification layer</a:t>
             </a:r>
           </a:p>
         </p:txBody>
@@ -4057,69 +4051,423 @@
           </a:fontRef>
         </p:style>
       </p:cxnSp>
+      <p:cxnSp>
+        <p:nvCxnSpPr>
+          <p:cNvPr id="34" name="Straight Arrow Connector 33">
+            <a:extLst>
+              <a:ext uri="{FF2B5EF4-FFF2-40B4-BE49-F238E27FC236}">
+                <a16:creationId xmlns:a16="http://schemas.microsoft.com/office/drawing/2014/main" id="{99853CF1-C1AA-8AB7-81A5-C9B67C5EE85D}"/>
+              </a:ext>
+            </a:extLst>
+          </p:cNvPr>
+          <p:cNvCxnSpPr>
+            <a:stCxn id="8" idx="3"/>
+            <a:endCxn id="9" idx="1"/>
+          </p:cNvCxnSpPr>
+          <p:nvPr/>
+        </p:nvCxnSpPr>
+        <p:spPr>
+          <a:xfrm>
+            <a:off x="3600450" y="1557338"/>
+            <a:ext cx="447675" cy="0"/>
+          </a:xfrm>
+          <a:prstGeom prst="straightConnector1">
+            <a:avLst/>
+          </a:prstGeom>
+          <a:ln w="12700">
+            <a:solidFill>
+              <a:schemeClr val="tx1"/>
+            </a:solidFill>
+            <a:tailEnd type="triangle"/>
+          </a:ln>
+        </p:spPr>
+        <p:style>
+          <a:lnRef idx="2">
+            <a:schemeClr val="accent1"/>
+          </a:lnRef>
+          <a:fillRef idx="0">
+            <a:schemeClr val="accent1"/>
+          </a:fillRef>
+          <a:effectRef idx="1">
+            <a:schemeClr val="accent1"/>
+          </a:effectRef>
+          <a:fontRef idx="minor">
+            <a:schemeClr val="tx1"/>
+          </a:fontRef>
+        </p:style>
+      </p:cxnSp>
+      <p:cxnSp>
+        <p:nvCxnSpPr>
+          <p:cNvPr id="35" name="Straight Arrow Connector 34">
+            <a:extLst>
+              <a:ext uri="{FF2B5EF4-FFF2-40B4-BE49-F238E27FC236}">
+                <a16:creationId xmlns:a16="http://schemas.microsoft.com/office/drawing/2014/main" id="{80C281A6-3BDC-2CE0-E7DF-AC2CDD2558B4}"/>
+              </a:ext>
+            </a:extLst>
+          </p:cNvPr>
+          <p:cNvCxnSpPr/>
+          <p:nvPr/>
+        </p:nvCxnSpPr>
+        <p:spPr>
+          <a:xfrm>
+            <a:off x="2390774" y="1557336"/>
+            <a:ext cx="447675" cy="0"/>
+          </a:xfrm>
+          <a:prstGeom prst="straightConnector1">
+            <a:avLst/>
+          </a:prstGeom>
+          <a:ln w="12700">
+            <a:solidFill>
+              <a:schemeClr val="tx1"/>
+            </a:solidFill>
+            <a:tailEnd type="triangle"/>
+          </a:ln>
+        </p:spPr>
+        <p:style>
+          <a:lnRef idx="2">
+            <a:schemeClr val="accent1"/>
+          </a:lnRef>
+          <a:fillRef idx="0">
+            <a:schemeClr val="accent1"/>
+          </a:fillRef>
+          <a:effectRef idx="1">
+            <a:schemeClr val="accent1"/>
+          </a:effectRef>
+          <a:fontRef idx="minor">
+            <a:schemeClr val="tx1"/>
+          </a:fontRef>
+        </p:style>
+      </p:cxnSp>
+      <p:sp>
+        <p:nvSpPr>
+          <p:cNvPr id="36" name="TextBox 35">
+            <a:extLst>
+              <a:ext uri="{FF2B5EF4-FFF2-40B4-BE49-F238E27FC236}">
+                <a16:creationId xmlns:a16="http://schemas.microsoft.com/office/drawing/2014/main" id="{96221E31-089D-E948-1492-75FFBF06D838}"/>
+              </a:ext>
+            </a:extLst>
+          </p:cNvPr>
+          <p:cNvSpPr txBox="1"/>
+          <p:nvPr/>
+        </p:nvSpPr>
+        <p:spPr>
+          <a:xfrm>
+            <a:off x="3764904" y="3158977"/>
+            <a:ext cx="1650058" cy="276999"/>
+          </a:xfrm>
+          <a:prstGeom prst="rect">
+            <a:avLst/>
+          </a:prstGeom>
+          <a:noFill/>
+        </p:spPr>
+        <p:txBody>
+          <a:bodyPr wrap="square" rtlCol="0">
+            <a:spAutoFit/>
+          </a:bodyPr>
+          <a:lstStyle/>
+          <a:p>
+            <a:r>
+              <a:rPr lang="en-US" sz="1200" dirty="0">
+                <a:latin typeface="Helvetica" panose="020B0604020202020204" pitchFamily="34" charset="0"/>
+                <a:cs typeface="Helvetica" panose="020B0604020202020204" pitchFamily="34" charset="0"/>
+              </a:rPr>
+              <a:t>Root cause analysis          </a:t>
+            </a:r>
+          </a:p>
+        </p:txBody>
+      </p:sp>
+      <p:cxnSp>
+        <p:nvCxnSpPr>
+          <p:cNvPr id="38" name="Straight Arrow Connector 37">
+            <a:extLst>
+              <a:ext uri="{FF2B5EF4-FFF2-40B4-BE49-F238E27FC236}">
+                <a16:creationId xmlns:a16="http://schemas.microsoft.com/office/drawing/2014/main" id="{4649CC0B-5FD3-C0C3-8857-1C8D24403A60}"/>
+              </a:ext>
+            </a:extLst>
+          </p:cNvPr>
+          <p:cNvCxnSpPr>
+            <a:cxnSpLocks/>
+          </p:cNvCxnSpPr>
+          <p:nvPr/>
+        </p:nvCxnSpPr>
+        <p:spPr>
+          <a:xfrm>
+            <a:off x="4448175" y="2820419"/>
+            <a:ext cx="0" cy="377748"/>
+          </a:xfrm>
+          <a:prstGeom prst="straightConnector1">
+            <a:avLst/>
+          </a:prstGeom>
+          <a:ln w="12700">
+            <a:solidFill>
+              <a:schemeClr val="tx1"/>
+            </a:solidFill>
+            <a:tailEnd type="triangle"/>
+          </a:ln>
+        </p:spPr>
+        <p:style>
+          <a:lnRef idx="2">
+            <a:schemeClr val="accent1"/>
+          </a:lnRef>
+          <a:fillRef idx="0">
+            <a:schemeClr val="accent1"/>
+          </a:fillRef>
+          <a:effectRef idx="1">
+            <a:schemeClr val="accent1"/>
+          </a:effectRef>
+          <a:fontRef idx="minor">
+            <a:schemeClr val="tx1"/>
+          </a:fontRef>
+        </p:style>
+      </p:cxnSp>
+      <p:sp>
+        <p:nvSpPr>
+          <p:cNvPr id="46" name="TextBox 45">
+            <a:extLst>
+              <a:ext uri="{FF2B5EF4-FFF2-40B4-BE49-F238E27FC236}">
+                <a16:creationId xmlns:a16="http://schemas.microsoft.com/office/drawing/2014/main" id="{798C6164-7DA2-0854-983B-0A3CB4002480}"/>
+              </a:ext>
+            </a:extLst>
+          </p:cNvPr>
+          <p:cNvSpPr txBox="1"/>
+          <p:nvPr/>
+        </p:nvSpPr>
+        <p:spPr>
+          <a:xfrm>
+            <a:off x="6324599" y="942587"/>
+            <a:ext cx="3090862" cy="276999"/>
+          </a:xfrm>
+          <a:prstGeom prst="rect">
+            <a:avLst/>
+          </a:prstGeom>
+          <a:noFill/>
+        </p:spPr>
+        <p:txBody>
+          <a:bodyPr wrap="square" rtlCol="0">
+            <a:spAutoFit/>
+          </a:bodyPr>
+          <a:lstStyle/>
+          <a:p>
+            <a:r>
+              <a:rPr lang="en-US" sz="1200" dirty="0">
+                <a:latin typeface="Helvetica" panose="020B0604020202020204" pitchFamily="34" charset="0"/>
+                <a:cs typeface="Helvetica" panose="020B0604020202020204" pitchFamily="34" charset="0"/>
+              </a:rPr>
+              <a:t>Fuzzy Classifier</a:t>
+            </a:r>
+          </a:p>
+        </p:txBody>
+      </p:sp>
+      <p:sp>
+        <p:nvSpPr>
+          <p:cNvPr id="47" name="Rectangle 46">
+            <a:extLst>
+              <a:ext uri="{FF2B5EF4-FFF2-40B4-BE49-F238E27FC236}">
+                <a16:creationId xmlns:a16="http://schemas.microsoft.com/office/drawing/2014/main" id="{0E113E02-D3EE-621C-592E-B97A705A308D}"/>
+              </a:ext>
+            </a:extLst>
+          </p:cNvPr>
+          <p:cNvSpPr/>
+          <p:nvPr/>
+        </p:nvSpPr>
+        <p:spPr>
+          <a:xfrm>
+            <a:off x="2776539" y="933448"/>
+            <a:ext cx="3314698" cy="1029507"/>
+          </a:xfrm>
+          <a:prstGeom prst="rect">
+            <a:avLst/>
+          </a:prstGeom>
+          <a:noFill/>
+          <a:ln w="15875">
+            <a:solidFill>
+              <a:schemeClr val="accent1">
+                <a:shade val="15000"/>
+              </a:schemeClr>
+            </a:solidFill>
+            <a:prstDash val="dash"/>
+          </a:ln>
+        </p:spPr>
+        <p:style>
+          <a:lnRef idx="0">
+            <a:scrgbClr r="0" g="0" b="0"/>
+          </a:lnRef>
+          <a:fillRef idx="0">
+            <a:scrgbClr r="0" g="0" b="0"/>
+          </a:fillRef>
+          <a:effectRef idx="0">
+            <a:scrgbClr r="0" g="0" b="0"/>
+          </a:effectRef>
+          <a:fontRef idx="minor">
+            <a:schemeClr val="dk1"/>
+          </a:fontRef>
+        </p:style>
+        <p:txBody>
+          <a:bodyPr rtlCol="0" anchor="ctr"/>
+          <a:lstStyle/>
+          <a:p>
+            <a:pPr algn="ctr"/>
+            <a:endParaRPr lang="en-US"/>
+          </a:p>
+        </p:txBody>
+      </p:sp>
+      <p:sp>
+        <p:nvSpPr>
+          <p:cNvPr id="48" name="TextBox 47">
+            <a:extLst>
+              <a:ext uri="{FF2B5EF4-FFF2-40B4-BE49-F238E27FC236}">
+                <a16:creationId xmlns:a16="http://schemas.microsoft.com/office/drawing/2014/main" id="{EF606A2C-E31D-9885-CD0E-5ADA48F6BD2D}"/>
+              </a:ext>
+            </a:extLst>
+          </p:cNvPr>
+          <p:cNvSpPr txBox="1"/>
+          <p:nvPr/>
+        </p:nvSpPr>
+        <p:spPr>
+          <a:xfrm>
+            <a:off x="2781301" y="942972"/>
+            <a:ext cx="3090862" cy="276999"/>
+          </a:xfrm>
+          <a:prstGeom prst="rect">
+            <a:avLst/>
+          </a:prstGeom>
+          <a:noFill/>
+        </p:spPr>
+        <p:txBody>
+          <a:bodyPr wrap="square" rtlCol="0">
+            <a:spAutoFit/>
+          </a:bodyPr>
+          <a:lstStyle/>
+          <a:p>
+            <a:r>
+              <a:rPr lang="en-US" sz="1200" dirty="0">
+                <a:latin typeface="Helvetica" panose="020B0604020202020204" pitchFamily="34" charset="0"/>
+                <a:cs typeface="Helvetica" panose="020B0604020202020204" pitchFamily="34" charset="0"/>
+              </a:rPr>
+              <a:t>Feature extractor</a:t>
+            </a:r>
+          </a:p>
+        </p:txBody>
+      </p:sp>
+      <p:cxnSp>
+        <p:nvCxnSpPr>
+          <p:cNvPr id="50" name="Straight Arrow Connector 49">
+            <a:extLst>
+              <a:ext uri="{FF2B5EF4-FFF2-40B4-BE49-F238E27FC236}">
+                <a16:creationId xmlns:a16="http://schemas.microsoft.com/office/drawing/2014/main" id="{8A2D72D2-20EB-7820-0146-C312B3028512}"/>
+              </a:ext>
+            </a:extLst>
+          </p:cNvPr>
+          <p:cNvCxnSpPr>
+            <a:stCxn id="19" idx="3"/>
+          </p:cNvCxnSpPr>
+          <p:nvPr/>
+        </p:nvCxnSpPr>
+        <p:spPr>
+          <a:xfrm flipV="1">
+            <a:off x="7296148" y="1557336"/>
+            <a:ext cx="171451" cy="2"/>
+          </a:xfrm>
+          <a:prstGeom prst="straightConnector1">
+            <a:avLst/>
+          </a:prstGeom>
+          <a:ln w="12700">
+            <a:solidFill>
+              <a:schemeClr val="tx1"/>
+            </a:solidFill>
+            <a:tailEnd type="triangle"/>
+          </a:ln>
+        </p:spPr>
+        <p:style>
+          <a:lnRef idx="2">
+            <a:schemeClr val="accent1"/>
+          </a:lnRef>
+          <a:fillRef idx="0">
+            <a:schemeClr val="accent1"/>
+          </a:fillRef>
+          <a:effectRef idx="1">
+            <a:schemeClr val="accent1"/>
+          </a:effectRef>
+          <a:fontRef idx="minor">
+            <a:schemeClr val="tx1"/>
+          </a:fontRef>
+        </p:style>
+      </p:cxnSp>
       <mc:AlternateContent xmlns:mc="http://schemas.openxmlformats.org/markup-compatibility/2006">
         <mc:Choice xmlns:a14="http://schemas.microsoft.com/office/drawing/2010/main" Requires="a14">
           <p:sp>
             <p:nvSpPr>
-              <p:cNvPr id="30" name="TextBox 29">
+              <p:cNvPr id="2" name="Oval 1">
                 <a:extLst>
                   <a:ext uri="{FF2B5EF4-FFF2-40B4-BE49-F238E27FC236}">
-                    <a16:creationId xmlns:a16="http://schemas.microsoft.com/office/drawing/2014/main" id="{86A79950-CCEB-981E-9706-28E89A8BC4F6}"/>
+                    <a16:creationId xmlns:a16="http://schemas.microsoft.com/office/drawing/2014/main" id="{DE562CAD-D269-11FC-57F5-C64F6696089A}"/>
                   </a:ext>
                 </a:extLst>
               </p:cNvPr>
-              <p:cNvSpPr txBox="1"/>
+              <p:cNvSpPr/>
               <p:nvPr/>
             </p:nvSpPr>
             <p:spPr>
               <a:xfrm>
-                <a:off x="8991600" y="1222117"/>
-                <a:ext cx="1749027" cy="461665"/>
+                <a:off x="9182096" y="1343025"/>
+                <a:ext cx="933449" cy="457200"/>
               </a:xfrm>
-              <a:prstGeom prst="rect">
+              <a:prstGeom prst="ellipse">
                 <a:avLst/>
               </a:prstGeom>
-              <a:noFill/>
             </p:spPr>
+            <p:style>
+              <a:lnRef idx="1">
+                <a:schemeClr val="accent6"/>
+              </a:lnRef>
+              <a:fillRef idx="2">
+                <a:schemeClr val="accent6"/>
+              </a:fillRef>
+              <a:effectRef idx="1">
+                <a:schemeClr val="accent6"/>
+              </a:effectRef>
+              <a:fontRef idx="minor">
+                <a:schemeClr val="dk1"/>
+              </a:fontRef>
+            </p:style>
             <p:txBody>
-              <a:bodyPr wrap="square" rtlCol="0">
-                <a:spAutoFit/>
-              </a:bodyPr>
+              <a:bodyPr rtlCol="0" anchor="ctr"/>
               <a:lstStyle/>
               <a:p>
+                <a:pPr algn="ctr"/>
                 <a:r>
-                  <a:rPr lang="en-US" sz="1200" dirty="0">
+                  <a:rPr lang="en-US" sz="1100" dirty="0">
                     <a:latin typeface="Helvetica" panose="020B0604020202020204" pitchFamily="34" charset="0"/>
                     <a:cs typeface="Helvetica" panose="020B0604020202020204" pitchFamily="34" charset="0"/>
                   </a:rPr>
-                  <a:t>Output prediction</a:t>
+                  <a:t>Output</a:t>
                 </a:r>
               </a:p>
               <a:p>
-                <a:pPr/>
+                <a:pPr algn="ctr"/>
                 <a14:m>
                   <m:oMathPara xmlns:m="http://schemas.openxmlformats.org/officeDocument/2006/math">
                     <m:oMathParaPr>
-                      <m:jc m:val="left"/>
+                      <m:jc m:val="centerGroup"/>
                     </m:oMathParaPr>
                     <m:oMath xmlns:m="http://schemas.openxmlformats.org/officeDocument/2006/math">
                       <m:r>
-                        <a:rPr lang="en-US" sz="1200" b="0" i="0" smtClean="0">
+                        <a:rPr lang="en-US" sz="1100">
                           <a:latin typeface="Cambria Math" panose="02040503050406030204" pitchFamily="18" charset="0"/>
                         </a:rPr>
-                        <m:t>   </m:t>
+                        <m:t> </m:t>
                       </m:r>
                       <m:r>
                         <m:rPr>
                           <m:sty m:val="p"/>
                         </m:rPr>
-                        <a:rPr lang="en-US" sz="1200" b="0" i="1" smtClean="0">
+                        <a:rPr lang="en-US" sz="1100" i="1">
                           <a:latin typeface="Cambria Math" panose="02040503050406030204" pitchFamily="18" charset="0"/>
                         </a:rPr>
                         <m:t>y</m:t>
                       </m:r>
                       <m:r>
-                        <a:rPr lang="en-US" sz="1200" b="0" i="1" smtClean="0">
+                        <a:rPr lang="en-US" sz="1100" i="1">
                           <a:latin typeface="Cambria Math" panose="02040503050406030204" pitchFamily="18" charset="0"/>
                         </a:rPr>
                         <m:t>̂</m:t>
@@ -4127,7 +4475,7 @@
                     </m:oMath>
                   </m:oMathPara>
                 </a14:m>
-                <a:endParaRPr lang="en-US" sz="1200" dirty="0">
+                <a:endParaRPr lang="en-US" sz="1100" dirty="0">
                   <a:latin typeface="Helvetica" panose="020B0604020202020204" pitchFamily="34" charset="0"/>
                   <a:cs typeface="Helvetica" panose="020B0604020202020204" pitchFamily="34" charset="0"/>
                 </a:endParaRPr>
@@ -4138,30 +4486,30 @@
         <mc:Fallback>
           <p:sp>
             <p:nvSpPr>
-              <p:cNvPr id="30" name="TextBox 29">
+              <p:cNvPr id="2" name="Oval 1">
                 <a:extLst>
                   <a:ext uri="{FF2B5EF4-FFF2-40B4-BE49-F238E27FC236}">
-                    <a16:creationId xmlns:a16="http://schemas.microsoft.com/office/drawing/2014/main" id="{86A79950-CCEB-981E-9706-28E89A8BC4F6}"/>
+                    <a16:creationId xmlns:a16="http://schemas.microsoft.com/office/drawing/2014/main" id="{DE562CAD-D269-11FC-57F5-C64F6696089A}"/>
                   </a:ext>
                 </a:extLst>
               </p:cNvPr>
-              <p:cNvSpPr txBox="1">
+              <p:cNvSpPr>
                 <a:spLocks noRot="1" noChangeAspect="1" noMove="1" noResize="1" noEditPoints="1" noAdjustHandles="1" noChangeArrowheads="1" noChangeShapeType="1" noTextEdit="1"/>
               </p:cNvSpPr>
               <p:nvPr/>
             </p:nvSpPr>
             <p:spPr>
               <a:xfrm>
-                <a:off x="8991600" y="1222117"/>
-                <a:ext cx="1749027" cy="461665"/>
+                <a:off x="9182096" y="1343025"/>
+                <a:ext cx="933449" cy="457200"/>
               </a:xfrm>
-              <a:prstGeom prst="rect">
+              <a:prstGeom prst="ellipse">
                 <a:avLst/>
               </a:prstGeom>
               <a:blipFill>
                 <a:blip r:embed="rId2"/>
                 <a:stretch>
-                  <a:fillRect t="-1316" b="-3947"/>
+                  <a:fillRect/>
                 </a:stretch>
               </a:blipFill>
             </p:spPr>
@@ -4180,352 +4528,6 @@
           </p:sp>
         </mc:Fallback>
       </mc:AlternateContent>
-      <p:cxnSp>
-        <p:nvCxnSpPr>
-          <p:cNvPr id="34" name="Straight Arrow Connector 33">
-            <a:extLst>
-              <a:ext uri="{FF2B5EF4-FFF2-40B4-BE49-F238E27FC236}">
-                <a16:creationId xmlns:a16="http://schemas.microsoft.com/office/drawing/2014/main" id="{99853CF1-C1AA-8AB7-81A5-C9B67C5EE85D}"/>
-              </a:ext>
-            </a:extLst>
-          </p:cNvPr>
-          <p:cNvCxnSpPr>
-            <a:stCxn id="8" idx="3"/>
-            <a:endCxn id="9" idx="1"/>
-          </p:cNvCxnSpPr>
-          <p:nvPr/>
-        </p:nvCxnSpPr>
-        <p:spPr>
-          <a:xfrm>
-            <a:off x="3600450" y="1557338"/>
-            <a:ext cx="447675" cy="0"/>
-          </a:xfrm>
-          <a:prstGeom prst="straightConnector1">
-            <a:avLst/>
-          </a:prstGeom>
-          <a:ln w="12700">
-            <a:solidFill>
-              <a:schemeClr val="tx1"/>
-            </a:solidFill>
-            <a:tailEnd type="triangle"/>
-          </a:ln>
-        </p:spPr>
-        <p:style>
-          <a:lnRef idx="2">
-            <a:schemeClr val="accent1"/>
-          </a:lnRef>
-          <a:fillRef idx="0">
-            <a:schemeClr val="accent1"/>
-          </a:fillRef>
-          <a:effectRef idx="1">
-            <a:schemeClr val="accent1"/>
-          </a:effectRef>
-          <a:fontRef idx="minor">
-            <a:schemeClr val="tx1"/>
-          </a:fontRef>
-        </p:style>
-      </p:cxnSp>
-      <p:cxnSp>
-        <p:nvCxnSpPr>
-          <p:cNvPr id="35" name="Straight Arrow Connector 34">
-            <a:extLst>
-              <a:ext uri="{FF2B5EF4-FFF2-40B4-BE49-F238E27FC236}">
-                <a16:creationId xmlns:a16="http://schemas.microsoft.com/office/drawing/2014/main" id="{80C281A6-3BDC-2CE0-E7DF-AC2CDD2558B4}"/>
-              </a:ext>
-            </a:extLst>
-          </p:cNvPr>
-          <p:cNvCxnSpPr/>
-          <p:nvPr/>
-        </p:nvCxnSpPr>
-        <p:spPr>
-          <a:xfrm>
-            <a:off x="2390774" y="1557336"/>
-            <a:ext cx="447675" cy="0"/>
-          </a:xfrm>
-          <a:prstGeom prst="straightConnector1">
-            <a:avLst/>
-          </a:prstGeom>
-          <a:ln w="12700">
-            <a:solidFill>
-              <a:schemeClr val="tx1"/>
-            </a:solidFill>
-            <a:tailEnd type="triangle"/>
-          </a:ln>
-        </p:spPr>
-        <p:style>
-          <a:lnRef idx="2">
-            <a:schemeClr val="accent1"/>
-          </a:lnRef>
-          <a:fillRef idx="0">
-            <a:schemeClr val="accent1"/>
-          </a:fillRef>
-          <a:effectRef idx="1">
-            <a:schemeClr val="accent1"/>
-          </a:effectRef>
-          <a:fontRef idx="minor">
-            <a:schemeClr val="tx1"/>
-          </a:fontRef>
-        </p:style>
-      </p:cxnSp>
-      <p:sp>
-        <p:nvSpPr>
-          <p:cNvPr id="36" name="TextBox 35">
-            <a:extLst>
-              <a:ext uri="{FF2B5EF4-FFF2-40B4-BE49-F238E27FC236}">
-                <a16:creationId xmlns:a16="http://schemas.microsoft.com/office/drawing/2014/main" id="{96221E31-089D-E948-1492-75FFBF06D838}"/>
-              </a:ext>
-            </a:extLst>
-          </p:cNvPr>
-          <p:cNvSpPr txBox="1"/>
-          <p:nvPr/>
-        </p:nvSpPr>
-        <p:spPr>
-          <a:xfrm>
-            <a:off x="3764904" y="3158977"/>
-            <a:ext cx="1650058" cy="276999"/>
-          </a:xfrm>
-          <a:prstGeom prst="rect">
-            <a:avLst/>
-          </a:prstGeom>
-          <a:noFill/>
-        </p:spPr>
-        <p:txBody>
-          <a:bodyPr wrap="square" rtlCol="0">
-            <a:spAutoFit/>
-          </a:bodyPr>
-          <a:lstStyle/>
-          <a:p>
-            <a:r>
-              <a:rPr lang="en-US" sz="1200" dirty="0">
-                <a:latin typeface="Helvetica" panose="020B0604020202020204" pitchFamily="34" charset="0"/>
-                <a:cs typeface="Helvetica" panose="020B0604020202020204" pitchFamily="34" charset="0"/>
-              </a:rPr>
-              <a:t>Root cause analysis          </a:t>
-            </a:r>
-          </a:p>
-        </p:txBody>
-      </p:sp>
-      <p:cxnSp>
-        <p:nvCxnSpPr>
-          <p:cNvPr id="38" name="Straight Arrow Connector 37">
-            <a:extLst>
-              <a:ext uri="{FF2B5EF4-FFF2-40B4-BE49-F238E27FC236}">
-                <a16:creationId xmlns:a16="http://schemas.microsoft.com/office/drawing/2014/main" id="{4649CC0B-5FD3-C0C3-8857-1C8D24403A60}"/>
-              </a:ext>
-            </a:extLst>
-          </p:cNvPr>
-          <p:cNvCxnSpPr>
-            <a:cxnSpLocks/>
-          </p:cNvCxnSpPr>
-          <p:nvPr/>
-        </p:nvCxnSpPr>
-        <p:spPr>
-          <a:xfrm>
-            <a:off x="4448175" y="2820419"/>
-            <a:ext cx="0" cy="377748"/>
-          </a:xfrm>
-          <a:prstGeom prst="straightConnector1">
-            <a:avLst/>
-          </a:prstGeom>
-          <a:ln w="12700">
-            <a:solidFill>
-              <a:schemeClr val="tx1"/>
-            </a:solidFill>
-            <a:tailEnd type="triangle"/>
-          </a:ln>
-        </p:spPr>
-        <p:style>
-          <a:lnRef idx="2">
-            <a:schemeClr val="accent1"/>
-          </a:lnRef>
-          <a:fillRef idx="0">
-            <a:schemeClr val="accent1"/>
-          </a:fillRef>
-          <a:effectRef idx="1">
-            <a:schemeClr val="accent1"/>
-          </a:effectRef>
-          <a:fontRef idx="minor">
-            <a:schemeClr val="tx1"/>
-          </a:fontRef>
-        </p:style>
-      </p:cxnSp>
-      <p:sp>
-        <p:nvSpPr>
-          <p:cNvPr id="46" name="TextBox 45">
-            <a:extLst>
-              <a:ext uri="{FF2B5EF4-FFF2-40B4-BE49-F238E27FC236}">
-                <a16:creationId xmlns:a16="http://schemas.microsoft.com/office/drawing/2014/main" id="{798C6164-7DA2-0854-983B-0A3CB4002480}"/>
-              </a:ext>
-            </a:extLst>
-          </p:cNvPr>
-          <p:cNvSpPr txBox="1"/>
-          <p:nvPr/>
-        </p:nvSpPr>
-        <p:spPr>
-          <a:xfrm>
-            <a:off x="6324599" y="942587"/>
-            <a:ext cx="3090862" cy="276999"/>
-          </a:xfrm>
-          <a:prstGeom prst="rect">
-            <a:avLst/>
-          </a:prstGeom>
-          <a:noFill/>
-        </p:spPr>
-        <p:txBody>
-          <a:bodyPr wrap="square" rtlCol="0">
-            <a:spAutoFit/>
-          </a:bodyPr>
-          <a:lstStyle/>
-          <a:p>
-            <a:r>
-              <a:rPr lang="en-US" sz="1200" dirty="0" err="1">
-                <a:latin typeface="Helvetica" panose="020B0604020202020204" pitchFamily="34" charset="0"/>
-                <a:cs typeface="Helvetica" panose="020B0604020202020204" pitchFamily="34" charset="0"/>
-              </a:rPr>
-              <a:t>BlockFuzzy</a:t>
-            </a:r>
-            <a:endParaRPr lang="en-US" sz="1200" dirty="0">
-              <a:latin typeface="Helvetica" panose="020B0604020202020204" pitchFamily="34" charset="0"/>
-              <a:cs typeface="Helvetica" panose="020B0604020202020204" pitchFamily="34" charset="0"/>
-            </a:endParaRPr>
-          </a:p>
-        </p:txBody>
-      </p:sp>
-      <p:sp>
-        <p:nvSpPr>
-          <p:cNvPr id="47" name="Rectangle 46">
-            <a:extLst>
-              <a:ext uri="{FF2B5EF4-FFF2-40B4-BE49-F238E27FC236}">
-                <a16:creationId xmlns:a16="http://schemas.microsoft.com/office/drawing/2014/main" id="{0E113E02-D3EE-621C-592E-B97A705A308D}"/>
-              </a:ext>
-            </a:extLst>
-          </p:cNvPr>
-          <p:cNvSpPr/>
-          <p:nvPr/>
-        </p:nvSpPr>
-        <p:spPr>
-          <a:xfrm>
-            <a:off x="2776539" y="933448"/>
-            <a:ext cx="3314698" cy="1029507"/>
-          </a:xfrm>
-          <a:prstGeom prst="rect">
-            <a:avLst/>
-          </a:prstGeom>
-          <a:noFill/>
-          <a:ln w="15875">
-            <a:solidFill>
-              <a:schemeClr val="accent1">
-                <a:shade val="15000"/>
-              </a:schemeClr>
-            </a:solidFill>
-            <a:prstDash val="dash"/>
-          </a:ln>
-        </p:spPr>
-        <p:style>
-          <a:lnRef idx="0">
-            <a:scrgbClr r="0" g="0" b="0"/>
-          </a:lnRef>
-          <a:fillRef idx="0">
-            <a:scrgbClr r="0" g="0" b="0"/>
-          </a:fillRef>
-          <a:effectRef idx="0">
-            <a:scrgbClr r="0" g="0" b="0"/>
-          </a:effectRef>
-          <a:fontRef idx="minor">
-            <a:schemeClr val="dk1"/>
-          </a:fontRef>
-        </p:style>
-        <p:txBody>
-          <a:bodyPr rtlCol="0" anchor="ctr"/>
-          <a:lstStyle/>
-          <a:p>
-            <a:pPr algn="ctr"/>
-            <a:endParaRPr lang="en-US"/>
-          </a:p>
-        </p:txBody>
-      </p:sp>
-      <p:sp>
-        <p:nvSpPr>
-          <p:cNvPr id="48" name="TextBox 47">
-            <a:extLst>
-              <a:ext uri="{FF2B5EF4-FFF2-40B4-BE49-F238E27FC236}">
-                <a16:creationId xmlns:a16="http://schemas.microsoft.com/office/drawing/2014/main" id="{EF606A2C-E31D-9885-CD0E-5ADA48F6BD2D}"/>
-              </a:ext>
-            </a:extLst>
-          </p:cNvPr>
-          <p:cNvSpPr txBox="1"/>
-          <p:nvPr/>
-        </p:nvSpPr>
-        <p:spPr>
-          <a:xfrm>
-            <a:off x="2781301" y="942972"/>
-            <a:ext cx="3090862" cy="276999"/>
-          </a:xfrm>
-          <a:prstGeom prst="rect">
-            <a:avLst/>
-          </a:prstGeom>
-          <a:noFill/>
-        </p:spPr>
-        <p:txBody>
-          <a:bodyPr wrap="square" rtlCol="0">
-            <a:spAutoFit/>
-          </a:bodyPr>
-          <a:lstStyle/>
-          <a:p>
-            <a:r>
-              <a:rPr lang="en-US" sz="1200" dirty="0">
-                <a:latin typeface="Helvetica" panose="020B0604020202020204" pitchFamily="34" charset="0"/>
-                <a:cs typeface="Helvetica" panose="020B0604020202020204" pitchFamily="34" charset="0"/>
-              </a:rPr>
-              <a:t>Feature extractor</a:t>
-            </a:r>
-          </a:p>
-        </p:txBody>
-      </p:sp>
-      <p:cxnSp>
-        <p:nvCxnSpPr>
-          <p:cNvPr id="50" name="Straight Arrow Connector 49">
-            <a:extLst>
-              <a:ext uri="{FF2B5EF4-FFF2-40B4-BE49-F238E27FC236}">
-                <a16:creationId xmlns:a16="http://schemas.microsoft.com/office/drawing/2014/main" id="{8A2D72D2-20EB-7820-0146-C312B3028512}"/>
-              </a:ext>
-            </a:extLst>
-          </p:cNvPr>
-          <p:cNvCxnSpPr>
-            <a:stCxn id="19" idx="3"/>
-          </p:cNvCxnSpPr>
-          <p:nvPr/>
-        </p:nvCxnSpPr>
-        <p:spPr>
-          <a:xfrm flipV="1">
-            <a:off x="7296148" y="1557336"/>
-            <a:ext cx="171451" cy="2"/>
-          </a:xfrm>
-          <a:prstGeom prst="straightConnector1">
-            <a:avLst/>
-          </a:prstGeom>
-          <a:ln w="12700">
-            <a:solidFill>
-              <a:schemeClr val="tx1"/>
-            </a:solidFill>
-            <a:tailEnd type="triangle"/>
-          </a:ln>
-        </p:spPr>
-        <p:style>
-          <a:lnRef idx="2">
-            <a:schemeClr val="accent1"/>
-          </a:lnRef>
-          <a:fillRef idx="0">
-            <a:schemeClr val="accent1"/>
-          </a:fillRef>
-          <a:effectRef idx="1">
-            <a:schemeClr val="accent1"/>
-          </a:effectRef>
-          <a:fontRef idx="minor">
-            <a:schemeClr val="tx1"/>
-          </a:fontRef>
-        </p:style>
-      </p:cxnSp>
     </p:spTree>
     <p:extLst>
       <p:ext uri="{BB962C8B-B14F-4D97-AF65-F5344CB8AC3E}">
@@ -4544,7 +4546,13 @@
   <p:cSld>
     <p:spTree>
       <p:nvGrpSpPr>
-        <p:cNvPr id="1" name=""/>
+        <p:cNvPr id="1" name="">
+          <a:extLst>
+            <a:ext uri="{FF2B5EF4-FFF2-40B4-BE49-F238E27FC236}">
+              <a16:creationId xmlns:a16="http://schemas.microsoft.com/office/drawing/2014/main" id="{4688E6C8-DB5A-D390-F99C-D6C991707957}"/>
+            </a:ext>
+          </a:extLst>
+        </p:cNvPr>
         <p:cNvGrpSpPr/>
         <p:nvPr/>
       </p:nvGrpSpPr>
@@ -4561,7 +4569,7 @@
           <p:cNvPr id="4" name="Rectangle 3">
             <a:extLst>
               <a:ext uri="{FF2B5EF4-FFF2-40B4-BE49-F238E27FC236}">
-                <a16:creationId xmlns:a16="http://schemas.microsoft.com/office/drawing/2014/main" id="{1C4427F1-58EB-B5CF-2AEA-B626CCCDEFEB}"/>
+                <a16:creationId xmlns:a16="http://schemas.microsoft.com/office/drawing/2014/main" id="{257CAA76-8C0C-D580-AFBB-444C121C324C}"/>
               </a:ext>
             </a:extLst>
           </p:cNvPr>
@@ -4570,8 +4578,8 @@
         </p:nvSpPr>
         <p:spPr>
           <a:xfrm>
-            <a:off x="1707864" y="818970"/>
-            <a:ext cx="3416586" cy="1159493"/>
+            <a:off x="1707864" y="548642"/>
+            <a:ext cx="3416586" cy="1615438"/>
           </a:xfrm>
           <a:prstGeom prst="rect">
             <a:avLst/>
@@ -4608,7 +4616,7 @@
           <p:cNvPr id="6" name="TextBox 5">
             <a:extLst>
               <a:ext uri="{FF2B5EF4-FFF2-40B4-BE49-F238E27FC236}">
-                <a16:creationId xmlns:a16="http://schemas.microsoft.com/office/drawing/2014/main" id="{414C28C0-8A71-5804-3432-69EE6322C9FA}"/>
+                <a16:creationId xmlns:a16="http://schemas.microsoft.com/office/drawing/2014/main" id="{99CA0C95-9738-CCD0-063D-2C667B8C5626}"/>
               </a:ext>
             </a:extLst>
           </p:cNvPr>
@@ -4617,7 +4625,7 @@
         </p:nvSpPr>
         <p:spPr>
           <a:xfrm>
-            <a:off x="1886582" y="295568"/>
+            <a:off x="3162664" y="105799"/>
             <a:ext cx="1978222" cy="338554"/>
           </a:xfrm>
           <a:prstGeom prst="rect">
@@ -4636,7 +4644,7 @@
                 <a:latin typeface="Helvetica" panose="020B0604020202020204" pitchFamily="34" charset="0"/>
                 <a:cs typeface="Helvetica" panose="020B0604020202020204" pitchFamily="34" charset="0"/>
               </a:rPr>
-              <a:t>Inference system</a:t>
+              <a:t>Inference System</a:t>
             </a:r>
           </a:p>
         </p:txBody>
@@ -4646,7 +4654,7 @@
           <p:cNvPr id="7" name="Rectangle 6">
             <a:extLst>
               <a:ext uri="{FF2B5EF4-FFF2-40B4-BE49-F238E27FC236}">
-                <a16:creationId xmlns:a16="http://schemas.microsoft.com/office/drawing/2014/main" id="{9B391936-C898-A012-5B78-33889F0CB8A7}"/>
+                <a16:creationId xmlns:a16="http://schemas.microsoft.com/office/drawing/2014/main" id="{1EB526D8-22CB-9CCE-591A-665DBFC6B7FC}"/>
               </a:ext>
             </a:extLst>
           </p:cNvPr>
@@ -4655,7 +4663,7 @@
         </p:nvSpPr>
         <p:spPr>
           <a:xfrm>
-            <a:off x="1947862" y="1224965"/>
+            <a:off x="1947862" y="1529765"/>
             <a:ext cx="787008" cy="495300"/>
           </a:xfrm>
           <a:prstGeom prst="rect">
@@ -4696,7 +4704,7 @@
           <p:cNvPr id="8" name="Rectangle 7">
             <a:extLst>
               <a:ext uri="{FF2B5EF4-FFF2-40B4-BE49-F238E27FC236}">
-                <a16:creationId xmlns:a16="http://schemas.microsoft.com/office/drawing/2014/main" id="{1BF168B9-44DE-11B9-0144-589148DC298D}"/>
+                <a16:creationId xmlns:a16="http://schemas.microsoft.com/office/drawing/2014/main" id="{A645BA32-DA9D-5DBB-7275-CB3F8BC1E816}"/>
               </a:ext>
             </a:extLst>
           </p:cNvPr>
@@ -4705,7 +4713,7 @@
         </p:nvSpPr>
         <p:spPr>
           <a:xfrm>
-            <a:off x="3046217" y="1224965"/>
+            <a:off x="3046217" y="1529765"/>
             <a:ext cx="787008" cy="495300"/>
           </a:xfrm>
           <a:prstGeom prst="rect">
@@ -4741,14 +4749,14 @@
           </a:p>
         </p:txBody>
       </p:sp>
-      <mc:AlternateContent xmlns:mc="http://schemas.openxmlformats.org/markup-compatibility/2006">
-        <mc:Choice xmlns:a14="http://schemas.microsoft.com/office/drawing/2010/main" Requires="a14">
+      <mc:AlternateContent xmlns:mc="http://schemas.openxmlformats.org/markup-compatibility/2006" xmlns:a14="http://schemas.microsoft.com/office/drawing/2010/main">
+        <mc:Choice Requires="a14">
           <p:sp>
             <p:nvSpPr>
               <p:cNvPr id="11" name="Oval 10">
                 <a:extLst>
                   <a:ext uri="{FF2B5EF4-FFF2-40B4-BE49-F238E27FC236}">
-                    <a16:creationId xmlns:a16="http://schemas.microsoft.com/office/drawing/2014/main" id="{24979C0F-1042-EAFB-FFB9-654D9C41DFF9}"/>
+                    <a16:creationId xmlns:a16="http://schemas.microsoft.com/office/drawing/2014/main" id="{FD0AAEEB-5919-908B-F145-8C5E78897E8A}"/>
                   </a:ext>
                 </a:extLst>
               </p:cNvPr>
@@ -4844,7 +4852,7 @@
             </p:txBody>
           </p:sp>
         </mc:Choice>
-        <mc:Fallback>
+        <mc:Fallback xmlns="">
           <p:sp>
             <p:nvSpPr>
               <p:cNvPr id="11" name="Oval 10">
@@ -4894,7 +4902,7 @@
           <p:cNvPr id="12" name="Rectangle 11">
             <a:extLst>
               <a:ext uri="{FF2B5EF4-FFF2-40B4-BE49-F238E27FC236}">
-                <a16:creationId xmlns:a16="http://schemas.microsoft.com/office/drawing/2014/main" id="{8345F595-5DDC-53DE-F500-67F40DC9CBB1}"/>
+                <a16:creationId xmlns:a16="http://schemas.microsoft.com/office/drawing/2014/main" id="{23E5E369-0D84-973E-04A8-5BE6944D1AD1}"/>
               </a:ext>
             </a:extLst>
           </p:cNvPr>
@@ -4903,7 +4911,7 @@
         </p:nvSpPr>
         <p:spPr>
           <a:xfrm>
-            <a:off x="4151775" y="1224965"/>
+            <a:off x="4151775" y="1529765"/>
             <a:ext cx="787008" cy="495300"/>
           </a:xfrm>
           <a:prstGeom prst="rect">
@@ -4945,7 +4953,7 @@
                 <a:latin typeface="Helvetica" panose="020B0604020202020204" pitchFamily="34" charset="0"/>
                 <a:cs typeface="Helvetica" panose="020B0604020202020204" pitchFamily="34" charset="0"/>
               </a:rPr>
-              <a:t>Block</a:t>
+              <a:t>Fuzzy</a:t>
             </a:r>
           </a:p>
           <a:p>
@@ -4958,7 +4966,7 @@
                 <a:latin typeface="Helvetica" panose="020B0604020202020204" pitchFamily="34" charset="0"/>
                 <a:cs typeface="Helvetica" panose="020B0604020202020204" pitchFamily="34" charset="0"/>
               </a:rPr>
-              <a:t>Fuzzy</a:t>
+              <a:t>Classifier</a:t>
             </a:r>
           </a:p>
         </p:txBody>
@@ -4968,7 +4976,7 @@
           <p:cNvPr id="14" name="TextBox 13">
             <a:extLst>
               <a:ext uri="{FF2B5EF4-FFF2-40B4-BE49-F238E27FC236}">
-                <a16:creationId xmlns:a16="http://schemas.microsoft.com/office/drawing/2014/main" id="{64E3F1CF-5C9F-C5E0-1159-867E04BA5BEE}"/>
+                <a16:creationId xmlns:a16="http://schemas.microsoft.com/office/drawing/2014/main" id="{4797C24C-8717-239B-B149-63413F6E13C9}"/>
               </a:ext>
             </a:extLst>
           </p:cNvPr>
@@ -4977,7 +4985,7 @@
         </p:nvSpPr>
         <p:spPr>
           <a:xfrm>
-            <a:off x="1707863" y="864041"/>
+            <a:off x="1707863" y="591165"/>
             <a:ext cx="1978222" cy="276999"/>
           </a:xfrm>
           <a:prstGeom prst="rect">
@@ -5006,7 +5014,7 @@
           <p:cNvPr id="16" name="Straight Arrow Connector 15">
             <a:extLst>
               <a:ext uri="{FF2B5EF4-FFF2-40B4-BE49-F238E27FC236}">
-                <a16:creationId xmlns:a16="http://schemas.microsoft.com/office/drawing/2014/main" id="{6CF0495D-50BA-A49F-5BD8-781CB4C7C072}"/>
+                <a16:creationId xmlns:a16="http://schemas.microsoft.com/office/drawing/2014/main" id="{9838B537-6D36-4898-DDEB-2543277C7D82}"/>
               </a:ext>
             </a:extLst>
           </p:cNvPr>
@@ -5051,7 +5059,7 @@
           <p:cNvPr id="18" name="Straight Arrow Connector 17">
             <a:extLst>
               <a:ext uri="{FF2B5EF4-FFF2-40B4-BE49-F238E27FC236}">
-                <a16:creationId xmlns:a16="http://schemas.microsoft.com/office/drawing/2014/main" id="{3CF13B6B-747F-DF8B-3156-6A285980B334}"/>
+                <a16:creationId xmlns:a16="http://schemas.microsoft.com/office/drawing/2014/main" id="{BF037714-1899-C85F-3A05-D36FE4D74FAB}"/>
               </a:ext>
             </a:extLst>
           </p:cNvPr>
@@ -5062,7 +5070,7 @@
         </p:nvCxnSpPr>
         <p:spPr>
           <a:xfrm flipV="1">
-            <a:off x="2741187" y="1472615"/>
+            <a:off x="2741187" y="1777415"/>
             <a:ext cx="311347" cy="8780"/>
           </a:xfrm>
           <a:prstGeom prst="straightConnector1">
@@ -5095,7 +5103,7 @@
           <p:cNvPr id="19" name="Straight Arrow Connector 18">
             <a:extLst>
               <a:ext uri="{FF2B5EF4-FFF2-40B4-BE49-F238E27FC236}">
-                <a16:creationId xmlns:a16="http://schemas.microsoft.com/office/drawing/2014/main" id="{0693B6A7-8A60-EF02-A952-2F9B95E6E62B}"/>
+                <a16:creationId xmlns:a16="http://schemas.microsoft.com/office/drawing/2014/main" id="{24BAD248-57DF-0158-C1BD-1B18C438BF25}"/>
               </a:ext>
             </a:extLst>
           </p:cNvPr>
@@ -5106,7 +5114,7 @@
         </p:nvCxnSpPr>
         <p:spPr>
           <a:xfrm flipV="1">
-            <a:off x="3842009" y="1463835"/>
+            <a:off x="3842009" y="1768635"/>
             <a:ext cx="311347" cy="8780"/>
           </a:xfrm>
           <a:prstGeom prst="straightConnector1">
@@ -5139,7 +5147,7 @@
           <p:cNvPr id="20" name="Rectangle 19">
             <a:extLst>
               <a:ext uri="{FF2B5EF4-FFF2-40B4-BE49-F238E27FC236}">
-                <a16:creationId xmlns:a16="http://schemas.microsoft.com/office/drawing/2014/main" id="{4B2B6E3B-FA13-9151-2184-0DB523AF7996}"/>
+                <a16:creationId xmlns:a16="http://schemas.microsoft.com/office/drawing/2014/main" id="{C414115C-55A9-80F1-2E56-334A063653A1}"/>
               </a:ext>
             </a:extLst>
           </p:cNvPr>
@@ -5148,7 +5156,7 @@
         </p:nvSpPr>
         <p:spPr>
           <a:xfrm>
-            <a:off x="255392" y="2276475"/>
+            <a:off x="255392" y="2300009"/>
             <a:ext cx="1142998" cy="760667"/>
           </a:xfrm>
           <a:prstGeom prst="rect">
@@ -5213,7 +5221,7 @@
           <p:cNvPr id="24" name="Straight Arrow Connector 23">
             <a:extLst>
               <a:ext uri="{FF2B5EF4-FFF2-40B4-BE49-F238E27FC236}">
-                <a16:creationId xmlns:a16="http://schemas.microsoft.com/office/drawing/2014/main" id="{DA4EDCE9-9F2B-8209-27F3-9A35A1AC4162}"/>
+                <a16:creationId xmlns:a16="http://schemas.microsoft.com/office/drawing/2014/main" id="{BEFB2315-5C65-98A3-497C-C9EBBC4E6F47}"/>
               </a:ext>
             </a:extLst>
           </p:cNvPr>
@@ -5227,7 +5235,7 @@
         <p:spPr>
           <a:xfrm flipH="1">
             <a:off x="826891" y="1774541"/>
-            <a:ext cx="1" cy="501934"/>
+            <a:ext cx="1" cy="525468"/>
           </a:xfrm>
           <a:prstGeom prst="straightConnector1">
             <a:avLst/>
@@ -5261,7 +5269,7 @@
               <p:cNvPr id="26" name="Oval 25">
                 <a:extLst>
                   <a:ext uri="{FF2B5EF4-FFF2-40B4-BE49-F238E27FC236}">
-                    <a16:creationId xmlns:a16="http://schemas.microsoft.com/office/drawing/2014/main" id="{EBC60E58-1400-C731-12B7-264C83F6D1F8}"/>
+                    <a16:creationId xmlns:a16="http://schemas.microsoft.com/office/drawing/2014/main" id="{8E918CF0-99A0-8353-B4E4-FD209F58BC17}"/>
                   </a:ext>
                 </a:extLst>
               </p:cNvPr>
@@ -5270,8 +5278,8 @@
             </p:nvSpPr>
             <p:spPr>
               <a:xfrm>
-                <a:off x="255391" y="3530870"/>
-                <a:ext cx="1142999" cy="579977"/>
+                <a:off x="2117341" y="2390351"/>
+                <a:ext cx="1142998" cy="579977"/>
               </a:xfrm>
               <a:prstGeom prst="ellipse">
                 <a:avLst/>
@@ -5366,7 +5374,7 @@
               <p:cNvPr id="26" name="Oval 25">
                 <a:extLst>
                   <a:ext uri="{FF2B5EF4-FFF2-40B4-BE49-F238E27FC236}">
-                    <a16:creationId xmlns:a16="http://schemas.microsoft.com/office/drawing/2014/main" id="{EBC60E58-1400-C731-12B7-264C83F6D1F8}"/>
+                    <a16:creationId xmlns:a16="http://schemas.microsoft.com/office/drawing/2014/main" id="{8E918CF0-99A0-8353-B4E4-FD209F58BC17}"/>
                   </a:ext>
                 </a:extLst>
               </p:cNvPr>
@@ -5377,8 +5385,8 @@
             </p:nvSpPr>
             <p:spPr>
               <a:xfrm>
-                <a:off x="255391" y="3530870"/>
-                <a:ext cx="1142999" cy="579977"/>
+                <a:off x="2117341" y="2390351"/>
+                <a:ext cx="1142998" cy="579977"/>
               </a:xfrm>
               <a:prstGeom prst="ellipse">
                 <a:avLst/>
@@ -5386,7 +5394,7 @@
               <a:blipFill>
                 <a:blip r:embed="rId3"/>
                 <a:stretch>
-                  <a:fillRect b="-8247"/>
+                  <a:fillRect t="-1031" b="-7216"/>
                 </a:stretch>
               </a:blipFill>
             </p:spPr>
@@ -5412,7 +5420,7 @@
               <p:cNvPr id="28" name="Oval 27">
                 <a:extLst>
                   <a:ext uri="{FF2B5EF4-FFF2-40B4-BE49-F238E27FC236}">
-                    <a16:creationId xmlns:a16="http://schemas.microsoft.com/office/drawing/2014/main" id="{BF68418B-F358-8A87-41CC-65E705EDD20B}"/>
+                    <a16:creationId xmlns:a16="http://schemas.microsoft.com/office/drawing/2014/main" id="{97B8F65F-BD42-2395-3BD5-D4EB3E5F3A0B}"/>
                   </a:ext>
                 </a:extLst>
               </p:cNvPr>
@@ -5421,7 +5429,7 @@
             </p:nvSpPr>
             <p:spPr>
               <a:xfrm>
-                <a:off x="2041624" y="2408794"/>
+                <a:off x="6812192" y="1484552"/>
                 <a:ext cx="1142999" cy="579977"/>
               </a:xfrm>
               <a:prstGeom prst="ellipse">
@@ -5525,7 +5533,7 @@
               <p:cNvPr id="28" name="Oval 27">
                 <a:extLst>
                   <a:ext uri="{FF2B5EF4-FFF2-40B4-BE49-F238E27FC236}">
-                    <a16:creationId xmlns:a16="http://schemas.microsoft.com/office/drawing/2014/main" id="{BF68418B-F358-8A87-41CC-65E705EDD20B}"/>
+                    <a16:creationId xmlns:a16="http://schemas.microsoft.com/office/drawing/2014/main" id="{97B8F65F-BD42-2395-3BD5-D4EB3E5F3A0B}"/>
                   </a:ext>
                 </a:extLst>
               </p:cNvPr>
@@ -5536,7 +5544,7 @@
             </p:nvSpPr>
             <p:spPr>
               <a:xfrm>
-                <a:off x="2041624" y="2408794"/>
+                <a:off x="6812192" y="1484552"/>
                 <a:ext cx="1142999" cy="579977"/>
               </a:xfrm>
               <a:prstGeom prst="ellipse">
@@ -5569,57 +5577,12 @@
           </p:sp>
         </mc:Fallback>
       </mc:AlternateContent>
-      <p:cxnSp>
-        <p:nvCxnSpPr>
-          <p:cNvPr id="30" name="Connector: Elbow 29">
-            <a:extLst>
-              <a:ext uri="{FF2B5EF4-FFF2-40B4-BE49-F238E27FC236}">
-                <a16:creationId xmlns:a16="http://schemas.microsoft.com/office/drawing/2014/main" id="{DE19CC90-F882-3530-5AB4-D4FC65F1AC81}"/>
-              </a:ext>
-            </a:extLst>
-          </p:cNvPr>
-          <p:cNvCxnSpPr>
-            <a:stCxn id="12" idx="2"/>
-            <a:endCxn id="28" idx="6"/>
-          </p:cNvCxnSpPr>
-          <p:nvPr/>
-        </p:nvCxnSpPr>
-        <p:spPr>
-          <a:xfrm rot="5400000">
-            <a:off x="3375692" y="1529196"/>
-            <a:ext cx="978518" cy="1360656"/>
-          </a:xfrm>
-          <a:prstGeom prst="bentConnector2">
-            <a:avLst/>
-          </a:prstGeom>
-          <a:ln w="12700">
-            <a:solidFill>
-              <a:schemeClr val="tx1"/>
-            </a:solidFill>
-            <a:tailEnd type="triangle"/>
-          </a:ln>
-        </p:spPr>
-        <p:style>
-          <a:lnRef idx="2">
-            <a:schemeClr val="accent1"/>
-          </a:lnRef>
-          <a:fillRef idx="0">
-            <a:schemeClr val="accent1"/>
-          </a:fillRef>
-          <a:effectRef idx="1">
-            <a:schemeClr val="accent1"/>
-          </a:effectRef>
-          <a:fontRef idx="minor">
-            <a:schemeClr val="tx1"/>
-          </a:fontRef>
-        </p:style>
-      </p:cxnSp>
       <p:sp>
         <p:nvSpPr>
           <p:cNvPr id="31" name="Rectangle 30">
             <a:extLst>
               <a:ext uri="{FF2B5EF4-FFF2-40B4-BE49-F238E27FC236}">
-                <a16:creationId xmlns:a16="http://schemas.microsoft.com/office/drawing/2014/main" id="{8CFD6A26-A292-B83A-718F-F965CB5A15A6}"/>
+                <a16:creationId xmlns:a16="http://schemas.microsoft.com/office/drawing/2014/main" id="{61120C6C-9B11-067A-D158-89F10B3B5528}"/>
               </a:ext>
             </a:extLst>
           </p:cNvPr>
@@ -5628,7 +5591,7 @@
         </p:nvSpPr>
         <p:spPr>
           <a:xfrm>
-            <a:off x="2041623" y="3452439"/>
+            <a:off x="4938783" y="2307899"/>
             <a:ext cx="1142999" cy="736838"/>
           </a:xfrm>
           <a:prstGeom prst="rect">
@@ -5688,147 +5651,12 @@
           </a:p>
         </p:txBody>
       </p:sp>
-      <p:cxnSp>
-        <p:nvCxnSpPr>
-          <p:cNvPr id="33" name="Straight Arrow Connector 32">
-            <a:extLst>
-              <a:ext uri="{FF2B5EF4-FFF2-40B4-BE49-F238E27FC236}">
-                <a16:creationId xmlns:a16="http://schemas.microsoft.com/office/drawing/2014/main" id="{3ED63CFF-E5A3-6113-D5C1-3AA9FF79C87C}"/>
-              </a:ext>
-            </a:extLst>
-          </p:cNvPr>
-          <p:cNvCxnSpPr>
-            <a:stCxn id="26" idx="6"/>
-            <a:endCxn id="31" idx="1"/>
-          </p:cNvCxnSpPr>
-          <p:nvPr/>
-        </p:nvCxnSpPr>
-        <p:spPr>
-          <a:xfrm flipV="1">
-            <a:off x="1398390" y="3820858"/>
-            <a:ext cx="643233" cy="1"/>
-          </a:xfrm>
-          <a:prstGeom prst="straightConnector1">
-            <a:avLst/>
-          </a:prstGeom>
-          <a:ln w="12700">
-            <a:solidFill>
-              <a:schemeClr val="tx1"/>
-            </a:solidFill>
-            <a:tailEnd type="triangle"/>
-          </a:ln>
-        </p:spPr>
-        <p:style>
-          <a:lnRef idx="2">
-            <a:schemeClr val="accent1"/>
-          </a:lnRef>
-          <a:fillRef idx="0">
-            <a:schemeClr val="accent1"/>
-          </a:fillRef>
-          <a:effectRef idx="1">
-            <a:schemeClr val="accent1"/>
-          </a:effectRef>
-          <a:fontRef idx="minor">
-            <a:schemeClr val="tx1"/>
-          </a:fontRef>
-        </p:style>
-      </p:cxnSp>
-      <p:cxnSp>
-        <p:nvCxnSpPr>
-          <p:cNvPr id="36" name="Straight Arrow Connector 35">
-            <a:extLst>
-              <a:ext uri="{FF2B5EF4-FFF2-40B4-BE49-F238E27FC236}">
-                <a16:creationId xmlns:a16="http://schemas.microsoft.com/office/drawing/2014/main" id="{4B7335B0-88F9-CC96-470A-E0C0BF3DEB44}"/>
-              </a:ext>
-            </a:extLst>
-          </p:cNvPr>
-          <p:cNvCxnSpPr>
-            <a:stCxn id="28" idx="4"/>
-          </p:cNvCxnSpPr>
-          <p:nvPr/>
-        </p:nvCxnSpPr>
-        <p:spPr>
-          <a:xfrm flipH="1">
-            <a:off x="2613123" y="2988771"/>
-            <a:ext cx="1" cy="440229"/>
-          </a:xfrm>
-          <a:prstGeom prst="straightConnector1">
-            <a:avLst/>
-          </a:prstGeom>
-          <a:ln w="12700">
-            <a:solidFill>
-              <a:schemeClr val="tx1"/>
-            </a:solidFill>
-            <a:tailEnd type="triangle"/>
-          </a:ln>
-        </p:spPr>
-        <p:style>
-          <a:lnRef idx="2">
-            <a:schemeClr val="accent1"/>
-          </a:lnRef>
-          <a:fillRef idx="0">
-            <a:schemeClr val="accent1"/>
-          </a:fillRef>
-          <a:effectRef idx="1">
-            <a:schemeClr val="accent1"/>
-          </a:effectRef>
-          <a:fontRef idx="minor">
-            <a:schemeClr val="tx1"/>
-          </a:fontRef>
-        </p:style>
-      </p:cxnSp>
-      <p:cxnSp>
-        <p:nvCxnSpPr>
-          <p:cNvPr id="38" name="Straight Arrow Connector 37">
-            <a:extLst>
-              <a:ext uri="{FF2B5EF4-FFF2-40B4-BE49-F238E27FC236}">
-                <a16:creationId xmlns:a16="http://schemas.microsoft.com/office/drawing/2014/main" id="{557612F1-3877-60A5-7D70-FDF38947DC0A}"/>
-              </a:ext>
-            </a:extLst>
-          </p:cNvPr>
-          <p:cNvCxnSpPr>
-            <a:cxnSpLocks/>
-            <a:stCxn id="20" idx="2"/>
-            <a:endCxn id="26" idx="0"/>
-          </p:cNvCxnSpPr>
-          <p:nvPr/>
-        </p:nvCxnSpPr>
-        <p:spPr>
-          <a:xfrm>
-            <a:off x="826891" y="3037142"/>
-            <a:ext cx="0" cy="493728"/>
-          </a:xfrm>
-          <a:prstGeom prst="straightConnector1">
-            <a:avLst/>
-          </a:prstGeom>
-          <a:ln w="12700">
-            <a:solidFill>
-              <a:schemeClr val="tx1"/>
-            </a:solidFill>
-            <a:tailEnd type="triangle"/>
-          </a:ln>
-        </p:spPr>
-        <p:style>
-          <a:lnRef idx="2">
-            <a:schemeClr val="accent1"/>
-          </a:lnRef>
-          <a:fillRef idx="0">
-            <a:schemeClr val="accent1"/>
-          </a:fillRef>
-          <a:effectRef idx="1">
-            <a:schemeClr val="accent1"/>
-          </a:effectRef>
-          <a:fontRef idx="minor">
-            <a:schemeClr val="tx1"/>
-          </a:fontRef>
-        </p:style>
-      </p:cxnSp>
       <p:sp>
         <p:nvSpPr>
           <p:cNvPr id="39" name="Rectangle 38">
             <a:extLst>
               <a:ext uri="{FF2B5EF4-FFF2-40B4-BE49-F238E27FC236}">
-                <a16:creationId xmlns:a16="http://schemas.microsoft.com/office/drawing/2014/main" id="{7F67C696-FAC9-4E33-9DF4-652D013EB54F}"/>
+                <a16:creationId xmlns:a16="http://schemas.microsoft.com/office/drawing/2014/main" id="{22000B42-F5D5-C0B9-747B-9219080B27D6}"/>
               </a:ext>
             </a:extLst>
           </p:cNvPr>
@@ -5837,7 +5665,7 @@
         </p:nvSpPr>
         <p:spPr>
           <a:xfrm>
-            <a:off x="2199822" y="4605819"/>
+            <a:off x="6970393" y="2390682"/>
             <a:ext cx="826599" cy="579648"/>
           </a:xfrm>
           <a:prstGeom prst="rect">
@@ -5932,7 +5760,7 @@
           <p:cNvPr id="40" name="Rectangle 39">
             <a:extLst>
               <a:ext uri="{FF2B5EF4-FFF2-40B4-BE49-F238E27FC236}">
-                <a16:creationId xmlns:a16="http://schemas.microsoft.com/office/drawing/2014/main" id="{9BD9721E-65A8-EEF2-336A-7F417697CE2F}"/>
+                <a16:creationId xmlns:a16="http://schemas.microsoft.com/office/drawing/2014/main" id="{1D73F208-1770-42E3-F222-42A3D566E7FB}"/>
               </a:ext>
             </a:extLst>
           </p:cNvPr>
@@ -5941,7 +5769,7 @@
         </p:nvSpPr>
         <p:spPr>
           <a:xfrm>
-            <a:off x="4144864" y="3537490"/>
+            <a:off x="5564343" y="729665"/>
             <a:ext cx="787008" cy="495300"/>
           </a:xfrm>
           <a:prstGeom prst="rect">
@@ -5993,7 +5821,7 @@
           <p:cNvPr id="41" name="Rectangle 40">
             <a:extLst>
               <a:ext uri="{FF2B5EF4-FFF2-40B4-BE49-F238E27FC236}">
-                <a16:creationId xmlns:a16="http://schemas.microsoft.com/office/drawing/2014/main" id="{51DD0404-1BA7-9936-4A0A-390817D60F6F}"/>
+                <a16:creationId xmlns:a16="http://schemas.microsoft.com/office/drawing/2014/main" id="{1275FAA8-FC6B-FFC5-EC73-09C91B3619D3}"/>
               </a:ext>
             </a:extLst>
           </p:cNvPr>
@@ -6002,7 +5830,7 @@
         </p:nvSpPr>
         <p:spPr>
           <a:xfrm>
-            <a:off x="4144864" y="4605819"/>
+            <a:off x="6970393" y="729665"/>
             <a:ext cx="787008" cy="495300"/>
           </a:xfrm>
           <a:prstGeom prst="rect">
@@ -6081,22 +5909,24 @@
       </p:sp>
       <p:cxnSp>
         <p:nvCxnSpPr>
-          <p:cNvPr id="43" name="Straight Arrow Connector 42">
-            <a:extLst>
-              <a:ext uri="{FF2B5EF4-FFF2-40B4-BE49-F238E27FC236}">
-                <a16:creationId xmlns:a16="http://schemas.microsoft.com/office/drawing/2014/main" id="{D5D38272-A41B-1848-18FD-D6056835276C}"/>
+          <p:cNvPr id="21" name="Straight Arrow Connector 20">
+            <a:extLst>
+              <a:ext uri="{FF2B5EF4-FFF2-40B4-BE49-F238E27FC236}">
+                <a16:creationId xmlns:a16="http://schemas.microsoft.com/office/drawing/2014/main" id="{88E67C1D-188B-59F3-986E-A6B8E4D999FE}"/>
               </a:ext>
             </a:extLst>
           </p:cNvPr>
           <p:cNvCxnSpPr>
             <a:cxnSpLocks/>
+            <a:stCxn id="20" idx="3"/>
+            <a:endCxn id="26" idx="2"/>
           </p:cNvCxnSpPr>
           <p:nvPr/>
         </p:nvCxnSpPr>
         <p:spPr>
-          <a:xfrm>
-            <a:off x="4545279" y="2449013"/>
-            <a:ext cx="0" cy="1081857"/>
+          <a:xfrm flipV="1">
+            <a:off x="1398390" y="2680340"/>
+            <a:ext cx="718951" cy="3"/>
           </a:xfrm>
           <a:prstGeom prst="straightConnector1">
             <a:avLst/>
@@ -6125,22 +5955,24 @@
       </p:cxnSp>
       <p:cxnSp>
         <p:nvCxnSpPr>
-          <p:cNvPr id="52" name="Straight Arrow Connector 51">
-            <a:extLst>
-              <a:ext uri="{FF2B5EF4-FFF2-40B4-BE49-F238E27FC236}">
-                <a16:creationId xmlns:a16="http://schemas.microsoft.com/office/drawing/2014/main" id="{4BCB4D47-83BB-B41A-0D49-1A658D68046A}"/>
+          <p:cNvPr id="22" name="Straight Arrow Connector 21">
+            <a:extLst>
+              <a:ext uri="{FF2B5EF4-FFF2-40B4-BE49-F238E27FC236}">
+                <a16:creationId xmlns:a16="http://schemas.microsoft.com/office/drawing/2014/main" id="{C419323F-0F1D-4800-DDDE-2B6F67C42792}"/>
               </a:ext>
             </a:extLst>
           </p:cNvPr>
           <p:cNvCxnSpPr>
             <a:cxnSpLocks/>
+            <a:stCxn id="26" idx="6"/>
+            <a:endCxn id="31" idx="1"/>
           </p:cNvCxnSpPr>
           <p:nvPr/>
         </p:nvCxnSpPr>
         <p:spPr>
-          <a:xfrm>
-            <a:off x="4538368" y="4026170"/>
-            <a:ext cx="0" cy="579649"/>
+          <a:xfrm flipV="1">
+            <a:off x="3260339" y="2676318"/>
+            <a:ext cx="1678444" cy="4022"/>
           </a:xfrm>
           <a:prstGeom prst="straightConnector1">
             <a:avLst/>
@@ -6169,24 +6001,23 @@
       </p:cxnSp>
       <p:cxnSp>
         <p:nvCxnSpPr>
-          <p:cNvPr id="54" name="Straight Arrow Connector 53">
-            <a:extLst>
-              <a:ext uri="{FF2B5EF4-FFF2-40B4-BE49-F238E27FC236}">
-                <a16:creationId xmlns:a16="http://schemas.microsoft.com/office/drawing/2014/main" id="{C6F958A0-0F15-1A06-7B88-7AD6F8D21A9A}"/>
+          <p:cNvPr id="25" name="Straight Arrow Connector 24">
+            <a:extLst>
+              <a:ext uri="{FF2B5EF4-FFF2-40B4-BE49-F238E27FC236}">
+                <a16:creationId xmlns:a16="http://schemas.microsoft.com/office/drawing/2014/main" id="{C2892B7B-EDF7-4506-41FE-77DA8895164B}"/>
               </a:ext>
             </a:extLst>
           </p:cNvPr>
           <p:cNvCxnSpPr>
             <a:cxnSpLocks/>
-            <a:stCxn id="31" idx="2"/>
-            <a:endCxn id="39" idx="0"/>
+            <a:endCxn id="40" idx="1"/>
           </p:cNvCxnSpPr>
           <p:nvPr/>
         </p:nvCxnSpPr>
         <p:spPr>
-          <a:xfrm flipH="1">
-            <a:off x="2613122" y="4189277"/>
-            <a:ext cx="1" cy="416542"/>
+          <a:xfrm>
+            <a:off x="5111750" y="977315"/>
+            <a:ext cx="452593" cy="0"/>
           </a:xfrm>
           <a:prstGeom prst="straightConnector1">
             <a:avLst/>
@@ -6213,10 +6044,306 @@
           </a:fontRef>
         </p:style>
       </p:cxnSp>
+      <p:cxnSp>
+        <p:nvCxnSpPr>
+          <p:cNvPr id="32" name="Straight Arrow Connector 31">
+            <a:extLst>
+              <a:ext uri="{FF2B5EF4-FFF2-40B4-BE49-F238E27FC236}">
+                <a16:creationId xmlns:a16="http://schemas.microsoft.com/office/drawing/2014/main" id="{3AD1B7D0-6DD5-5B2E-8B2C-31B654ED3F38}"/>
+              </a:ext>
+            </a:extLst>
+          </p:cNvPr>
+          <p:cNvCxnSpPr>
+            <a:cxnSpLocks/>
+            <a:endCxn id="28" idx="2"/>
+          </p:cNvCxnSpPr>
+          <p:nvPr/>
+        </p:nvCxnSpPr>
+        <p:spPr>
+          <a:xfrm>
+            <a:off x="5124450" y="1768635"/>
+            <a:ext cx="1687742" cy="5906"/>
+          </a:xfrm>
+          <a:prstGeom prst="straightConnector1">
+            <a:avLst/>
+          </a:prstGeom>
+          <a:ln w="12700">
+            <a:solidFill>
+              <a:schemeClr val="tx1"/>
+            </a:solidFill>
+            <a:tailEnd type="triangle"/>
+          </a:ln>
+        </p:spPr>
+        <p:style>
+          <a:lnRef idx="2">
+            <a:schemeClr val="accent1"/>
+          </a:lnRef>
+          <a:fillRef idx="0">
+            <a:schemeClr val="accent1"/>
+          </a:fillRef>
+          <a:effectRef idx="1">
+            <a:schemeClr val="accent1"/>
+          </a:effectRef>
+          <a:fontRef idx="minor">
+            <a:schemeClr val="tx1"/>
+          </a:fontRef>
+        </p:style>
+      </p:cxnSp>
+      <p:cxnSp>
+        <p:nvCxnSpPr>
+          <p:cNvPr id="34" name="Straight Arrow Connector 33">
+            <a:extLst>
+              <a:ext uri="{FF2B5EF4-FFF2-40B4-BE49-F238E27FC236}">
+                <a16:creationId xmlns:a16="http://schemas.microsoft.com/office/drawing/2014/main" id="{0F676376-5C9B-5140-54E9-976281ACD9CE}"/>
+              </a:ext>
+            </a:extLst>
+          </p:cNvPr>
+          <p:cNvCxnSpPr>
+            <a:cxnSpLocks/>
+            <a:endCxn id="41" idx="1"/>
+          </p:cNvCxnSpPr>
+          <p:nvPr/>
+        </p:nvCxnSpPr>
+        <p:spPr>
+          <a:xfrm>
+            <a:off x="6351351" y="977315"/>
+            <a:ext cx="619042" cy="0"/>
+          </a:xfrm>
+          <a:prstGeom prst="straightConnector1">
+            <a:avLst/>
+          </a:prstGeom>
+          <a:ln w="12700">
+            <a:solidFill>
+              <a:schemeClr val="tx1"/>
+            </a:solidFill>
+            <a:tailEnd type="triangle"/>
+          </a:ln>
+        </p:spPr>
+        <p:style>
+          <a:lnRef idx="2">
+            <a:schemeClr val="accent1"/>
+          </a:lnRef>
+          <a:fillRef idx="0">
+            <a:schemeClr val="accent1"/>
+          </a:fillRef>
+          <a:effectRef idx="1">
+            <a:schemeClr val="accent1"/>
+          </a:effectRef>
+          <a:fontRef idx="minor">
+            <a:schemeClr val="tx1"/>
+          </a:fontRef>
+        </p:style>
+      </p:cxnSp>
+      <p:cxnSp>
+        <p:nvCxnSpPr>
+          <p:cNvPr id="37" name="Straight Arrow Connector 36">
+            <a:extLst>
+              <a:ext uri="{FF2B5EF4-FFF2-40B4-BE49-F238E27FC236}">
+                <a16:creationId xmlns:a16="http://schemas.microsoft.com/office/drawing/2014/main" id="{EAF389AB-27B1-9F1C-D425-B21CB732055D}"/>
+              </a:ext>
+            </a:extLst>
+          </p:cNvPr>
+          <p:cNvCxnSpPr>
+            <a:cxnSpLocks/>
+            <a:stCxn id="31" idx="3"/>
+            <a:endCxn id="39" idx="1"/>
+          </p:cNvCxnSpPr>
+          <p:nvPr/>
+        </p:nvCxnSpPr>
+        <p:spPr>
+          <a:xfrm>
+            <a:off x="6081782" y="2676318"/>
+            <a:ext cx="888611" cy="4188"/>
+          </a:xfrm>
+          <a:prstGeom prst="straightConnector1">
+            <a:avLst/>
+          </a:prstGeom>
+          <a:ln w="12700">
+            <a:solidFill>
+              <a:schemeClr val="tx1"/>
+            </a:solidFill>
+            <a:tailEnd type="triangle"/>
+          </a:ln>
+        </p:spPr>
+        <p:style>
+          <a:lnRef idx="2">
+            <a:schemeClr val="accent1"/>
+          </a:lnRef>
+          <a:fillRef idx="0">
+            <a:schemeClr val="accent1"/>
+          </a:fillRef>
+          <a:effectRef idx="1">
+            <a:schemeClr val="accent1"/>
+          </a:effectRef>
+          <a:fontRef idx="minor">
+            <a:schemeClr val="tx1"/>
+          </a:fontRef>
+        </p:style>
+      </p:cxnSp>
+      <p:cxnSp>
+        <p:nvCxnSpPr>
+          <p:cNvPr id="61" name="Straight Arrow Connector 60">
+            <a:extLst>
+              <a:ext uri="{FF2B5EF4-FFF2-40B4-BE49-F238E27FC236}">
+                <a16:creationId xmlns:a16="http://schemas.microsoft.com/office/drawing/2014/main" id="{A32F0333-CC22-6AF4-F0F9-C24E959434D4}"/>
+              </a:ext>
+            </a:extLst>
+          </p:cNvPr>
+          <p:cNvCxnSpPr>
+            <a:cxnSpLocks/>
+            <a:endCxn id="31" idx="0"/>
+          </p:cNvCxnSpPr>
+          <p:nvPr/>
+        </p:nvCxnSpPr>
+        <p:spPr>
+          <a:xfrm>
+            <a:off x="5510282" y="1786195"/>
+            <a:ext cx="1" cy="521704"/>
+          </a:xfrm>
+          <a:prstGeom prst="straightConnector1">
+            <a:avLst/>
+          </a:prstGeom>
+          <a:ln w="12700">
+            <a:solidFill>
+              <a:schemeClr val="tx1"/>
+            </a:solidFill>
+            <a:prstDash val="dash"/>
+            <a:tailEnd type="triangle"/>
+          </a:ln>
+        </p:spPr>
+        <p:style>
+          <a:lnRef idx="2">
+            <a:schemeClr val="accent1"/>
+          </a:lnRef>
+          <a:fillRef idx="0">
+            <a:schemeClr val="accent1"/>
+          </a:fillRef>
+          <a:effectRef idx="1">
+            <a:schemeClr val="accent1"/>
+          </a:effectRef>
+          <a:fontRef idx="minor">
+            <a:schemeClr val="tx1"/>
+          </a:fontRef>
+        </p:style>
+      </p:cxnSp>
+      <p:sp>
+        <p:nvSpPr>
+          <p:cNvPr id="2" name="Rectangle 1">
+            <a:extLst>
+              <a:ext uri="{FF2B5EF4-FFF2-40B4-BE49-F238E27FC236}">
+                <a16:creationId xmlns:a16="http://schemas.microsoft.com/office/drawing/2014/main" id="{7AF5E49A-8982-E7A0-B06F-8EC62D22BA47}"/>
+              </a:ext>
+            </a:extLst>
+          </p:cNvPr>
+          <p:cNvSpPr/>
+          <p:nvPr/>
+        </p:nvSpPr>
+        <p:spPr>
+          <a:xfrm>
+            <a:off x="4070051" y="747225"/>
+            <a:ext cx="950455" cy="394461"/>
+          </a:xfrm>
+          <a:prstGeom prst="rect">
+            <a:avLst/>
+          </a:prstGeom>
+          <a:ln/>
+        </p:spPr>
+        <p:style>
+          <a:lnRef idx="1">
+            <a:schemeClr val="accent4"/>
+          </a:lnRef>
+          <a:fillRef idx="2">
+            <a:schemeClr val="accent4"/>
+          </a:fillRef>
+          <a:effectRef idx="1">
+            <a:schemeClr val="accent4"/>
+          </a:effectRef>
+          <a:fontRef idx="minor">
+            <a:schemeClr val="dk1"/>
+          </a:fontRef>
+        </p:style>
+        <p:txBody>
+          <a:bodyPr rtlCol="0" anchor="ctr"/>
+          <a:lstStyle/>
+          <a:p>
+            <a:pPr algn="ctr"/>
+            <a:r>
+              <a:rPr lang="en-US" sz="1100" dirty="0">
+                <a:solidFill>
+                  <a:schemeClr val="tx1"/>
+                </a:solidFill>
+                <a:latin typeface="Helvetica" panose="020B0604020202020204" pitchFamily="34" charset="0"/>
+                <a:cs typeface="Helvetica" panose="020B0604020202020204" pitchFamily="34" charset="0"/>
+              </a:rPr>
+              <a:t>Explainable </a:t>
+            </a:r>
+          </a:p>
+          <a:p>
+            <a:pPr algn="ctr"/>
+            <a:r>
+              <a:rPr lang="en-US" sz="1100" dirty="0">
+                <a:solidFill>
+                  <a:schemeClr val="tx1"/>
+                </a:solidFill>
+                <a:latin typeface="Helvetica" panose="020B0604020202020204" pitchFamily="34" charset="0"/>
+                <a:cs typeface="Helvetica" panose="020B0604020202020204" pitchFamily="34" charset="0"/>
+              </a:rPr>
+              <a:t>Component</a:t>
+            </a:r>
+          </a:p>
+        </p:txBody>
+      </p:sp>
+      <p:cxnSp>
+        <p:nvCxnSpPr>
+          <p:cNvPr id="5" name="Straight Arrow Connector 4">
+            <a:extLst>
+              <a:ext uri="{FF2B5EF4-FFF2-40B4-BE49-F238E27FC236}">
+                <a16:creationId xmlns:a16="http://schemas.microsoft.com/office/drawing/2014/main" id="{01862D38-13B0-C0D1-701F-DA6D261D6086}"/>
+              </a:ext>
+            </a:extLst>
+          </p:cNvPr>
+          <p:cNvCxnSpPr>
+            <a:cxnSpLocks/>
+            <a:stCxn id="12" idx="0"/>
+            <a:endCxn id="2" idx="2"/>
+          </p:cNvCxnSpPr>
+          <p:nvPr/>
+        </p:nvCxnSpPr>
+        <p:spPr>
+          <a:xfrm flipV="1">
+            <a:off x="4545279" y="1141686"/>
+            <a:ext cx="0" cy="388079"/>
+          </a:xfrm>
+          <a:prstGeom prst="straightConnector1">
+            <a:avLst/>
+          </a:prstGeom>
+          <a:ln w="12700">
+            <a:solidFill>
+              <a:schemeClr val="accent1"/>
+            </a:solidFill>
+            <a:prstDash val="dash"/>
+            <a:tailEnd type="triangle"/>
+          </a:ln>
+        </p:spPr>
+        <p:style>
+          <a:lnRef idx="2">
+            <a:schemeClr val="accent1"/>
+          </a:lnRef>
+          <a:fillRef idx="0">
+            <a:schemeClr val="accent1"/>
+          </a:fillRef>
+          <a:effectRef idx="1">
+            <a:schemeClr val="accent1"/>
+          </a:effectRef>
+          <a:fontRef idx="minor">
+            <a:schemeClr val="tx1"/>
+          </a:fontRef>
+        </p:style>
+      </p:cxnSp>
     </p:spTree>
     <p:extLst>
       <p:ext uri="{BB962C8B-B14F-4D97-AF65-F5344CB8AC3E}">
-        <p14:creationId xmlns:p14="http://schemas.microsoft.com/office/powerpoint/2010/main" val="3563901522"/>
+        <p14:creationId xmlns:p14="http://schemas.microsoft.com/office/powerpoint/2010/main" val="1293669667"/>
       </p:ext>
     </p:extLst>
   </p:cSld>

</xml_diff>